<commit_message>
Final commit, Updated presentation
</commit_message>
<xml_diff>
--- a/diagrams-and-models/presentation.pptx
+++ b/diagrams-and-models/presentation.pptx
@@ -125,6 +125,7 @@
 <file path=ppt/revisionInfo.xml><?xml version="1.0" encoding="utf-8"?>
 <p1510:revInfo xmlns:a="http://schemas.openxmlformats.org/drawingml/2006/main" xmlns:r="http://schemas.openxmlformats.org/officeDocument/2006/relationships" xmlns:p1510="http://schemas.microsoft.com/office/powerpoint/2015/10/main">
   <p1510:revLst>
+    <p1510:client id="{1E6A3B2F-781A-4CCF-9B63-DDA4710B8837}" v="20" dt="2021-04-06T01:08:37.879"/>
     <p1510:client id="{264837FF-0E43-4E42-AA8E-E22A3908CBC8}" v="26" dt="2021-04-05T06:14:45.838"/>
     <p1510:client id="{65664ECB-E55D-4508-8FD4-E355F89927E0}" v="868" dt="2021-04-04T19:18:54.929"/>
     <p1510:client id="{69897353-C223-4D21-B7D7-8979E934F37C}" v="1603" dt="2021-04-04T20:35:14.023"/>
@@ -158,6 +159,78 @@
             <ac:spMk id="4" creationId="{210C486A-0675-430B-AFD8-A0B6DDF67C1C}"/>
           </ac:spMkLst>
         </pc:spChg>
+      </pc:sldChg>
+    </pc:docChg>
+  </pc:docChgLst>
+  <pc:docChgLst>
+    <pc:chgData name="Гост потребител" userId="135fadbd047ffad2" providerId="Windows Live" clId="Web-{1E6A3B2F-781A-4CCF-9B63-DDA4710B8837}"/>
+    <pc:docChg chg="modSld">
+      <pc:chgData name="Гост потребител" userId="135fadbd047ffad2" providerId="Windows Live" clId="Web-{1E6A3B2F-781A-4CCF-9B63-DDA4710B8837}" dt="2021-04-06T01:08:37.879" v="16" actId="1076"/>
+      <pc:docMkLst>
+        <pc:docMk/>
+      </pc:docMkLst>
+      <pc:sldChg chg="addSp modSp">
+        <pc:chgData name="Гост потребител" userId="135fadbd047ffad2" providerId="Windows Live" clId="Web-{1E6A3B2F-781A-4CCF-9B63-DDA4710B8837}" dt="2021-04-06T01:08:37.879" v="16" actId="1076"/>
+        <pc:sldMkLst>
+          <pc:docMk/>
+          <pc:sldMk cId="3321610755" sldId="259"/>
+        </pc:sldMkLst>
+        <pc:spChg chg="mod">
+          <ac:chgData name="Гост потребител" userId="135fadbd047ffad2" providerId="Windows Live" clId="Web-{1E6A3B2F-781A-4CCF-9B63-DDA4710B8837}" dt="2021-04-06T01:07:29.908" v="4" actId="20577"/>
+          <ac:spMkLst>
+            <pc:docMk/>
+            <pc:sldMk cId="3321610755" sldId="259"/>
+            <ac:spMk id="3" creationId="{5C062803-D4CE-4381-A53C-CAFC2EEEA255}"/>
+          </ac:spMkLst>
+        </pc:spChg>
+        <pc:picChg chg="add mod">
+          <ac:chgData name="Гост потребител" userId="135fadbd047ffad2" providerId="Windows Live" clId="Web-{1E6A3B2F-781A-4CCF-9B63-DDA4710B8837}" dt="2021-04-06T01:08:37.879" v="16" actId="1076"/>
+          <ac:picMkLst>
+            <pc:docMk/>
+            <pc:sldMk cId="3321610755" sldId="259"/>
+            <ac:picMk id="5" creationId="{446B182D-E634-4366-8204-55AD46C690B1}"/>
+          </ac:picMkLst>
+        </pc:picChg>
+        <pc:picChg chg="mod">
+          <ac:chgData name="Гост потребител" userId="135fadbd047ffad2" providerId="Windows Live" clId="Web-{1E6A3B2F-781A-4CCF-9B63-DDA4710B8837}" dt="2021-04-06T01:08:33.785" v="15" actId="1076"/>
+          <ac:picMkLst>
+            <pc:docMk/>
+            <pc:sldMk cId="3321610755" sldId="259"/>
+            <ac:picMk id="13" creationId="{1789A508-88E9-4BC2-AEB3-E2EDAB6A307D}"/>
+          </ac:picMkLst>
+        </pc:picChg>
+        <pc:picChg chg="mod">
+          <ac:chgData name="Гост потребител" userId="135fadbd047ffad2" providerId="Windows Live" clId="Web-{1E6A3B2F-781A-4CCF-9B63-DDA4710B8837}" dt="2021-04-06T01:08:18.988" v="11" actId="1076"/>
+          <ac:picMkLst>
+            <pc:docMk/>
+            <pc:sldMk cId="3321610755" sldId="259"/>
+            <ac:picMk id="18" creationId="{685BBBFF-3A64-414A-A5EA-D18760DCAA83}"/>
+          </ac:picMkLst>
+        </pc:picChg>
+        <pc:picChg chg="mod">
+          <ac:chgData name="Гост потребител" userId="135fadbd047ffad2" providerId="Windows Live" clId="Web-{1E6A3B2F-781A-4CCF-9B63-DDA4710B8837}" dt="2021-04-06T01:08:31.113" v="14" actId="1076"/>
+          <ac:picMkLst>
+            <pc:docMk/>
+            <pc:sldMk cId="3321610755" sldId="259"/>
+            <ac:picMk id="20" creationId="{D25AECFF-2D99-4F92-8AED-3A451AF92DDB}"/>
+          </ac:picMkLst>
+        </pc:picChg>
+        <pc:picChg chg="mod">
+          <ac:chgData name="Гост потребител" userId="135fadbd047ffad2" providerId="Windows Live" clId="Web-{1E6A3B2F-781A-4CCF-9B63-DDA4710B8837}" dt="2021-04-06T01:08:21.128" v="12" actId="1076"/>
+          <ac:picMkLst>
+            <pc:docMk/>
+            <pc:sldMk cId="3321610755" sldId="259"/>
+            <ac:picMk id="22" creationId="{5FF917BB-3A52-4A16-B31B-21C3F23F81EB}"/>
+          </ac:picMkLst>
+        </pc:picChg>
+        <pc:picChg chg="mod">
+          <ac:chgData name="Гост потребител" userId="135fadbd047ffad2" providerId="Windows Live" clId="Web-{1E6A3B2F-781A-4CCF-9B63-DDA4710B8837}" dt="2021-04-06T01:08:14.691" v="10" actId="1076"/>
+          <ac:picMkLst>
+            <pc:docMk/>
+            <pc:sldMk cId="3321610755" sldId="259"/>
+            <ac:picMk id="24" creationId="{4AB7CC25-D9C1-4EB8-B8C7-11F0965B18B5}"/>
+          </ac:picMkLst>
+        </pc:picChg>
       </pc:sldChg>
     </pc:docChg>
   </pc:docChgLst>
@@ -15972,7 +16045,7 @@
         </p:spPr>
         <p:txBody>
           <a:bodyPr vert="horz" lIns="91440" tIns="45720" rIns="91440" bIns="45720" rtlCol="0" anchor="t">
-            <a:normAutofit fontScale="92500" lnSpcReduction="20000"/>
+            <a:normAutofit fontScale="85000" lnSpcReduction="10000"/>
           </a:bodyPr>
           <a:lstStyle/>
           <a:p>
@@ -16325,6 +16398,13 @@
               </a:rPr>
               <a:t>Hibernate</a:t>
             </a:r>
+            <a:endParaRPr lang="bg-BG" sz="1200" b="1">
+              <a:solidFill>
+                <a:schemeClr val="bg1"/>
+              </a:solidFill>
+              <a:ea typeface="+mj-lt"/>
+              <a:cs typeface="+mj-lt"/>
+            </a:endParaRPr>
           </a:p>
           <a:p>
             <a:pPr>
@@ -16370,6 +16450,13 @@
               </a:rPr>
               <a:t>Swagger</a:t>
             </a:r>
+            <a:endParaRPr lang="bg-BG" sz="1200" b="1">
+              <a:solidFill>
+                <a:schemeClr val="bg1"/>
+              </a:solidFill>
+              <a:ea typeface="+mj-lt"/>
+              <a:cs typeface="+mj-lt"/>
+            </a:endParaRPr>
           </a:p>
           <a:p>
             <a:pPr>
@@ -16387,6 +16474,11 @@
               </a:rPr>
               <a:t>Maven</a:t>
             </a:r>
+            <a:endParaRPr lang="bg-BG" sz="1200" b="1">
+              <a:solidFill>
+                <a:schemeClr val="bg1"/>
+              </a:solidFill>
+            </a:endParaRPr>
           </a:p>
           <a:p>
             <a:pPr>
@@ -16404,6 +16496,11 @@
               </a:rPr>
               <a:t>MySQL</a:t>
             </a:r>
+            <a:endParaRPr lang="bg-BG" sz="1200" b="1">
+              <a:solidFill>
+                <a:schemeClr val="bg1"/>
+              </a:solidFill>
+            </a:endParaRPr>
           </a:p>
           <a:p>
             <a:pPr>
@@ -16457,6 +16554,23 @@
                   <a:schemeClr val="bg1"/>
                 </a:solidFill>
               </a:rPr>
+              <a:t>JUnit</a:t>
+            </a:r>
+          </a:p>
+          <a:p>
+            <a:pPr>
+              <a:buClr>
+                <a:srgbClr val="F7F7F7"/>
+              </a:buClr>
+              <a:buFont typeface="Wingdings" charset="2"/>
+              <a:buChar char="Ø"/>
+            </a:pPr>
+            <a:r>
+              <a:rPr lang="bg-BG" sz="1200" b="1" dirty="0" err="1">
+                <a:solidFill>
+                  <a:schemeClr val="bg1"/>
+                </a:solidFill>
+              </a:rPr>
               <a:t>Itext</a:t>
             </a:r>
             <a:r>
@@ -16492,6 +16606,11 @@
               </a:rPr>
               <a:t>Box</a:t>
             </a:r>
+            <a:endParaRPr lang="bg-BG" sz="1200" b="1">
+              <a:solidFill>
+                <a:schemeClr val="bg1"/>
+              </a:solidFill>
+            </a:endParaRPr>
           </a:p>
           <a:p>
             <a:pPr>
@@ -16705,7 +16824,7 @@
         </p:blipFill>
         <p:spPr>
           <a:xfrm>
-            <a:off x="4993888" y="2131742"/>
+            <a:off x="5280581" y="1022692"/>
             <a:ext cx="1739590" cy="1739590"/>
           </a:xfrm>
           <a:prstGeom prst="rect">
@@ -16825,7 +16944,7 @@
         </p:blipFill>
         <p:spPr>
           <a:xfrm>
-            <a:off x="6759497" y="2960648"/>
+            <a:off x="7151814" y="3428410"/>
             <a:ext cx="2743200" cy="1828800"/>
           </a:xfrm>
           <a:prstGeom prst="rect">
@@ -16855,7 +16974,7 @@
         </p:blipFill>
         <p:spPr>
           <a:xfrm>
-            <a:off x="6564351" y="1263287"/>
+            <a:off x="7152826" y="2696752"/>
             <a:ext cx="968299" cy="939596"/>
           </a:xfrm>
           <a:prstGeom prst="rect">
@@ -16885,7 +17004,7 @@
         </p:blipFill>
         <p:spPr>
           <a:xfrm>
-            <a:off x="9919008" y="3005253"/>
+            <a:off x="10062355" y="2839273"/>
             <a:ext cx="1600201" cy="1600201"/>
           </a:xfrm>
           <a:prstGeom prst="rect">
@@ -16915,7 +17034,7 @@
         </p:blipFill>
         <p:spPr>
           <a:xfrm>
-            <a:off x="5281961" y="5026386"/>
+            <a:off x="5244238" y="5335713"/>
             <a:ext cx="2743200" cy="986937"/>
           </a:xfrm>
           <a:prstGeom prst="rect">
@@ -16947,6 +17066,36 @@
           <a:xfrm>
             <a:off x="9026912" y="5253226"/>
             <a:ext cx="2743200" cy="1146572"/>
+          </a:xfrm>
+          <a:prstGeom prst="rect">
+            <a:avLst/>
+          </a:prstGeom>
+        </p:spPr>
+      </p:pic>
+      <p:pic>
+        <p:nvPicPr>
+          <p:cNvPr id="5" name="Картина 5">
+            <a:extLst>
+              <a:ext uri="{FF2B5EF4-FFF2-40B4-BE49-F238E27FC236}">
+                <a16:creationId xmlns:a16="http://schemas.microsoft.com/office/drawing/2014/main" id="{446B182D-E634-4366-8204-55AD46C690B1}"/>
+              </a:ext>
+            </a:extLst>
+          </p:cNvPr>
+          <p:cNvPicPr>
+            <a:picLocks noChangeAspect="1"/>
+          </p:cNvPicPr>
+          <p:nvPr/>
+        </p:nvPicPr>
+        <p:blipFill>
+          <a:blip r:embed="rId11"/>
+          <a:stretch>
+            <a:fillRect/>
+          </a:stretch>
+        </p:blipFill>
+        <p:spPr>
+          <a:xfrm>
+            <a:off x="5244974" y="2940112"/>
+            <a:ext cx="1588884" cy="1588884"/>
           </a:xfrm>
           <a:prstGeom prst="rect">
             <a:avLst/>

</xml_diff>

<commit_message>
Refactoring queries and database
</commit_message>
<xml_diff>
--- a/diagrams-and-models/presentation.pptx
+++ b/diagrams-and-models/presentation.pptx
@@ -129,6 +129,7 @@
     <p1510:client id="{264837FF-0E43-4E42-AA8E-E22A3908CBC8}" v="26" dt="2021-04-05T06:14:45.838"/>
     <p1510:client id="{65664ECB-E55D-4508-8FD4-E355F89927E0}" v="868" dt="2021-04-04T19:18:54.929"/>
     <p1510:client id="{69897353-C223-4D21-B7D7-8979E934F37C}" v="1603" dt="2021-04-04T20:35:14.023"/>
+    <p1510:client id="{6D179D07-CD08-4754-87F8-E7DB739FEC7D}" v="12" dt="2021-04-11T20:35:11.691"/>
     <p1510:client id="{8FFCBCD3-F308-4023-B75E-DFC634ED4C8A}" v="145" dt="2021-04-05T12:40:27.600"/>
     <p1510:client id="{B6D2EFE0-4D6C-4E0F-B018-23FD01CC4053}" v="1" dt="2021-04-04T20:37:30.629"/>
     <p1510:client id="{FCEF9E56-E319-431A-BAB7-3D088914A7EE}" v="705" dt="2021-04-04T18:23:44.604"/>
@@ -159,6 +160,46 @@
             <ac:spMk id="4" creationId="{210C486A-0675-430B-AFD8-A0B6DDF67C1C}"/>
           </ac:spMkLst>
         </pc:spChg>
+      </pc:sldChg>
+    </pc:docChg>
+  </pc:docChgLst>
+  <pc:docChgLst>
+    <pc:chgData name="Гост потребител" userId="135fadbd047ffad2" providerId="Windows Live" clId="Web-{6D179D07-CD08-4754-87F8-E7DB739FEC7D}"/>
+    <pc:docChg chg="modSld">
+      <pc:chgData name="Гост потребител" userId="135fadbd047ffad2" providerId="Windows Live" clId="Web-{6D179D07-CD08-4754-87F8-E7DB739FEC7D}" dt="2021-04-11T20:35:11.691" v="10" actId="1076"/>
+      <pc:docMkLst>
+        <pc:docMk/>
+      </pc:docMkLst>
+      <pc:sldChg chg="addSp delSp modSp">
+        <pc:chgData name="Гост потребител" userId="135fadbd047ffad2" providerId="Windows Live" clId="Web-{6D179D07-CD08-4754-87F8-E7DB739FEC7D}" dt="2021-04-11T20:35:11.691" v="10" actId="1076"/>
+        <pc:sldMkLst>
+          <pc:docMk/>
+          <pc:sldMk cId="3467262261" sldId="261"/>
+        </pc:sldMkLst>
+        <pc:spChg chg="add del mod">
+          <ac:chgData name="Гост потребител" userId="135fadbd047ffad2" providerId="Windows Live" clId="Web-{6D179D07-CD08-4754-87F8-E7DB739FEC7D}" dt="2021-04-11T20:34:11.487" v="1"/>
+          <ac:spMkLst>
+            <pc:docMk/>
+            <pc:sldMk cId="3467262261" sldId="261"/>
+            <ac:spMk id="5" creationId="{ECFF34E9-BB98-4DDD-AD9D-C449BFC82AFF}"/>
+          </ac:spMkLst>
+        </pc:spChg>
+        <pc:picChg chg="del">
+          <ac:chgData name="Гост потребител" userId="135fadbd047ffad2" providerId="Windows Live" clId="Web-{6D179D07-CD08-4754-87F8-E7DB739FEC7D}" dt="2021-04-11T20:33:50.314" v="0"/>
+          <ac:picMkLst>
+            <pc:docMk/>
+            <pc:sldMk cId="3467262261" sldId="261"/>
+            <ac:picMk id="4" creationId="{15151A72-260B-44C9-B926-DE12985B7831}"/>
+          </ac:picMkLst>
+        </pc:picChg>
+        <pc:picChg chg="add mod ord">
+          <ac:chgData name="Гост потребител" userId="135fadbd047ffad2" providerId="Windows Live" clId="Web-{6D179D07-CD08-4754-87F8-E7DB739FEC7D}" dt="2021-04-11T20:35:11.691" v="10" actId="1076"/>
+          <ac:picMkLst>
+            <pc:docMk/>
+            <pc:sldMk cId="3467262261" sldId="261"/>
+            <ac:picMk id="6" creationId="{891C226F-2521-4456-B38B-14F9A0ED30CD}"/>
+          </ac:picMkLst>
+        </pc:picChg>
       </pc:sldChg>
     </pc:docChg>
   </pc:docChgLst>
@@ -4946,7 +4987,7 @@
           <a:p>
             <a:fld id="{4AAD347D-5ACD-4C99-B74B-A9C85AD731AF}" type="datetimeFigureOut">
               <a:rPr lang="en-US" dirty="0"/>
-              <a:t>4/5/2021</a:t>
+              <a:t>4/11/2021</a:t>
             </a:fld>
             <a:endParaRPr lang="en-US"/>
           </a:p>
@@ -5216,7 +5257,7 @@
           <a:p>
             <a:fld id="{4509A250-FF31-4206-8172-F9D3106AACB1}" type="datetimeFigureOut">
               <a:rPr lang="en-US" dirty="0"/>
-              <a:t>4/5/2021</a:t>
+              <a:t>4/11/2021</a:t>
             </a:fld>
             <a:endParaRPr lang="en-US"/>
           </a:p>
@@ -5409,7 +5450,7 @@
           <a:p>
             <a:fld id="{4509A250-FF31-4206-8172-F9D3106AACB1}" type="datetimeFigureOut">
               <a:rPr lang="en-US" dirty="0"/>
-              <a:t>4/5/2021</a:t>
+              <a:t>4/11/2021</a:t>
             </a:fld>
             <a:endParaRPr lang="en-US"/>
           </a:p>
@@ -5681,7 +5722,7 @@
           <a:p>
             <a:fld id="{4509A250-FF31-4206-8172-F9D3106AACB1}" type="datetimeFigureOut">
               <a:rPr lang="en-US" dirty="0"/>
-              <a:t>4/5/2021</a:t>
+              <a:t>4/11/2021</a:t>
             </a:fld>
             <a:endParaRPr lang="en-US"/>
           </a:p>
@@ -6021,7 +6062,7 @@
           <a:p>
             <a:fld id="{4509A250-FF31-4206-8172-F9D3106AACB1}" type="datetimeFigureOut">
               <a:rPr lang="en-US" dirty="0"/>
-              <a:t>4/5/2021</a:t>
+              <a:t>4/11/2021</a:t>
             </a:fld>
             <a:endParaRPr lang="en-US"/>
           </a:p>
@@ -6643,7 +6684,7 @@
           <a:p>
             <a:fld id="{4509A250-FF31-4206-8172-F9D3106AACB1}" type="datetimeFigureOut">
               <a:rPr lang="en-US" dirty="0"/>
-              <a:t>4/5/2021</a:t>
+              <a:t>4/11/2021</a:t>
             </a:fld>
             <a:endParaRPr lang="en-US"/>
           </a:p>
@@ -7490,7 +7531,7 @@
           <a:p>
             <a:fld id="{4509A250-FF31-4206-8172-F9D3106AACB1}" type="datetimeFigureOut">
               <a:rPr lang="en-US" dirty="0"/>
-              <a:t>4/5/2021</a:t>
+              <a:t>4/11/2021</a:t>
             </a:fld>
             <a:endParaRPr lang="en-US"/>
           </a:p>
@@ -7658,7 +7699,7 @@
           <a:p>
             <a:fld id="{4509A250-FF31-4206-8172-F9D3106AACB1}" type="datetimeFigureOut">
               <a:rPr lang="en-US" dirty="0"/>
-              <a:t>4/5/2021</a:t>
+              <a:t>4/11/2021</a:t>
             </a:fld>
             <a:endParaRPr lang="en-US"/>
           </a:p>
@@ -7836,7 +7877,7 @@
           <a:p>
             <a:fld id="{4509A250-FF31-4206-8172-F9D3106AACB1}" type="datetimeFigureOut">
               <a:rPr lang="en-US" dirty="0"/>
-              <a:t>4/5/2021</a:t>
+              <a:t>4/11/2021</a:t>
             </a:fld>
             <a:endParaRPr lang="en-US"/>
           </a:p>
@@ -8004,7 +8045,7 @@
           <a:p>
             <a:fld id="{4509A250-FF31-4206-8172-F9D3106AACB1}" type="datetimeFigureOut">
               <a:rPr lang="en-US" dirty="0"/>
-              <a:t>4/5/2021</a:t>
+              <a:t>4/11/2021</a:t>
             </a:fld>
             <a:endParaRPr lang="en-US"/>
           </a:p>
@@ -8250,7 +8291,7 @@
           <a:p>
             <a:fld id="{9796027F-7875-4030-9381-8BD8C4F21935}" type="datetimeFigureOut">
               <a:rPr lang="en-US" dirty="0"/>
-              <a:t>4/5/2021</a:t>
+              <a:t>4/11/2021</a:t>
             </a:fld>
             <a:endParaRPr lang="en-US"/>
           </a:p>
@@ -8539,7 +8580,7 @@
           <a:p>
             <a:fld id="{9796027F-7875-4030-9381-8BD8C4F21935}" type="datetimeFigureOut">
               <a:rPr lang="en-US" dirty="0"/>
-              <a:t>4/5/2021</a:t>
+              <a:t>4/11/2021</a:t>
             </a:fld>
             <a:endParaRPr lang="en-US"/>
           </a:p>
@@ -8980,7 +9021,7 @@
           <a:p>
             <a:fld id="{9796027F-7875-4030-9381-8BD8C4F21935}" type="datetimeFigureOut">
               <a:rPr lang="en-US" dirty="0"/>
-              <a:t>4/5/2021</a:t>
+              <a:t>4/11/2021</a:t>
             </a:fld>
             <a:endParaRPr lang="en-US"/>
           </a:p>
@@ -9097,7 +9138,7 @@
           <a:p>
             <a:fld id="{4509A250-FF31-4206-8172-F9D3106AACB1}" type="datetimeFigureOut">
               <a:rPr lang="en-US" dirty="0"/>
-              <a:t>4/5/2021</a:t>
+              <a:t>4/11/2021</a:t>
             </a:fld>
             <a:endParaRPr lang="en-US"/>
           </a:p>
@@ -9192,7 +9233,7 @@
           <a:p>
             <a:fld id="{4509A250-FF31-4206-8172-F9D3106AACB1}" type="datetimeFigureOut">
               <a:rPr lang="en-US" dirty="0"/>
-              <a:t>4/5/2021</a:t>
+              <a:t>4/11/2021</a:t>
             </a:fld>
             <a:endParaRPr lang="en-US"/>
           </a:p>
@@ -9469,7 +9510,7 @@
           <a:p>
             <a:fld id="{4509A250-FF31-4206-8172-F9D3106AACB1}" type="datetimeFigureOut">
               <a:rPr lang="en-US" dirty="0"/>
-              <a:t>4/5/2021</a:t>
+              <a:t>4/11/2021</a:t>
             </a:fld>
             <a:endParaRPr lang="en-US"/>
           </a:p>
@@ -9739,7 +9780,7 @@
           <a:p>
             <a:fld id="{4509A250-FF31-4206-8172-F9D3106AACB1}" type="datetimeFigureOut">
               <a:rPr lang="en-US" dirty="0"/>
-              <a:t>4/5/2021</a:t>
+              <a:t>4/11/2021</a:t>
             </a:fld>
             <a:endParaRPr lang="en-US"/>
           </a:p>
@@ -10166,7 +10207,7 @@
           <a:p>
             <a:fld id="{4AAD347D-5ACD-4C99-B74B-A9C85AD731AF}" type="datetimeFigureOut">
               <a:rPr lang="en-US" dirty="0"/>
-              <a:t>4/5/2021</a:t>
+              <a:t>4/11/2021</a:t>
             </a:fld>
             <a:endParaRPr lang="en-US"/>
           </a:p>
@@ -17920,10 +17961,10 @@
       </p:sp>
       <p:pic>
         <p:nvPicPr>
-          <p:cNvPr id="4" name="Картина 4" descr="Картина, която съдържа маса&#10;&#10;Описанието е генерирано автоматично">
+          <p:cNvPr id="6" name="Картина 6" descr="Картина, която съдържа маса&#10;&#10;Описанието е генерирано автоматично">
             <a:extLst>
               <a:ext uri="{FF2B5EF4-FFF2-40B4-BE49-F238E27FC236}">
-                <a16:creationId xmlns:a16="http://schemas.microsoft.com/office/drawing/2014/main" id="{15151A72-260B-44C9-B926-DE12985B7831}"/>
+                <a16:creationId xmlns:a16="http://schemas.microsoft.com/office/drawing/2014/main" id="{891C226F-2521-4456-B38B-14F9A0ED30CD}"/>
               </a:ext>
             </a:extLst>
           </p:cNvPr>
@@ -17942,8 +17983,8 @@
         </p:blipFill>
         <p:spPr>
           <a:xfrm>
-            <a:off x="2041671" y="835577"/>
-            <a:ext cx="8110603" cy="5793822"/>
+            <a:off x="2118344" y="835577"/>
+            <a:ext cx="7687769" cy="5858870"/>
           </a:xfrm>
         </p:spPr>
       </p:pic>

</xml_diff>